<commit_message>
Change the flow chart
</commit_message>
<xml_diff>
--- a/Graphs_paper/数据处理流程图.pptx
+++ b/Graphs_paper/数据处理流程图.pptx
@@ -6,6 +6,7 @@
   </p:sldMasterIdLst>
   <p:sldIdLst>
     <p:sldId id="256" r:id="rId2"/>
+    <p:sldId id="257" r:id="rId3"/>
   </p:sldIdLst>
   <p:sldSz cx="12192000" cy="6858000"/>
   <p:notesSz cx="6858000" cy="9144000"/>
@@ -104,6 +105,11 @@
       </a:defRPr>
     </a:lvl9pPr>
   </p:defaultTextStyle>
+  <p:extLst>
+    <p:ext uri="{EFAFB233-063F-42B5-8137-9DF3F51BA10A}">
+      <p15:sldGuideLst xmlns:p15="http://schemas.microsoft.com/office/powerpoint/2012/main"/>
+    </p:ext>
+  </p:extLst>
 </p:presentation>
 </file>
 
@@ -254,7 +260,7 @@
           <a:p>
             <a:fld id="{9B0EB393-AB97-45F5-AC14-BC10F6BBB4A2}" type="datetimeFigureOut">
               <a:rPr lang="zh-CN" altLang="en-US" smtClean="0"/>
-              <a:t>2023-09-10</a:t>
+              <a:t>2024/4/22</a:t>
             </a:fld>
             <a:endParaRPr lang="zh-CN" altLang="en-US"/>
           </a:p>
@@ -452,7 +458,7 @@
           <a:p>
             <a:fld id="{9B0EB393-AB97-45F5-AC14-BC10F6BBB4A2}" type="datetimeFigureOut">
               <a:rPr lang="zh-CN" altLang="en-US" smtClean="0"/>
-              <a:t>2023-09-10</a:t>
+              <a:t>2024/4/22</a:t>
             </a:fld>
             <a:endParaRPr lang="zh-CN" altLang="en-US"/>
           </a:p>
@@ -660,7 +666,7 @@
           <a:p>
             <a:fld id="{9B0EB393-AB97-45F5-AC14-BC10F6BBB4A2}" type="datetimeFigureOut">
               <a:rPr lang="zh-CN" altLang="en-US" smtClean="0"/>
-              <a:t>2023-09-10</a:t>
+              <a:t>2024/4/22</a:t>
             </a:fld>
             <a:endParaRPr lang="zh-CN" altLang="en-US"/>
           </a:p>
@@ -858,7 +864,7 @@
           <a:p>
             <a:fld id="{9B0EB393-AB97-45F5-AC14-BC10F6BBB4A2}" type="datetimeFigureOut">
               <a:rPr lang="zh-CN" altLang="en-US" smtClean="0"/>
-              <a:t>2023-09-10</a:t>
+              <a:t>2024/4/22</a:t>
             </a:fld>
             <a:endParaRPr lang="zh-CN" altLang="en-US"/>
           </a:p>
@@ -1133,7 +1139,7 @@
           <a:p>
             <a:fld id="{9B0EB393-AB97-45F5-AC14-BC10F6BBB4A2}" type="datetimeFigureOut">
               <a:rPr lang="zh-CN" altLang="en-US" smtClean="0"/>
-              <a:t>2023-09-10</a:t>
+              <a:t>2024/4/22</a:t>
             </a:fld>
             <a:endParaRPr lang="zh-CN" altLang="en-US"/>
           </a:p>
@@ -1398,7 +1404,7 @@
           <a:p>
             <a:fld id="{9B0EB393-AB97-45F5-AC14-BC10F6BBB4A2}" type="datetimeFigureOut">
               <a:rPr lang="zh-CN" altLang="en-US" smtClean="0"/>
-              <a:t>2023-09-10</a:t>
+              <a:t>2024/4/22</a:t>
             </a:fld>
             <a:endParaRPr lang="zh-CN" altLang="en-US"/>
           </a:p>
@@ -1810,7 +1816,7 @@
           <a:p>
             <a:fld id="{9B0EB393-AB97-45F5-AC14-BC10F6BBB4A2}" type="datetimeFigureOut">
               <a:rPr lang="zh-CN" altLang="en-US" smtClean="0"/>
-              <a:t>2023-09-10</a:t>
+              <a:t>2024/4/22</a:t>
             </a:fld>
             <a:endParaRPr lang="zh-CN" altLang="en-US"/>
           </a:p>
@@ -1951,7 +1957,7 @@
           <a:p>
             <a:fld id="{9B0EB393-AB97-45F5-AC14-BC10F6BBB4A2}" type="datetimeFigureOut">
               <a:rPr lang="zh-CN" altLang="en-US" smtClean="0"/>
-              <a:t>2023-09-10</a:t>
+              <a:t>2024/4/22</a:t>
             </a:fld>
             <a:endParaRPr lang="zh-CN" altLang="en-US"/>
           </a:p>
@@ -2064,7 +2070,7 @@
           <a:p>
             <a:fld id="{9B0EB393-AB97-45F5-AC14-BC10F6BBB4A2}" type="datetimeFigureOut">
               <a:rPr lang="zh-CN" altLang="en-US" smtClean="0"/>
-              <a:t>2023-09-10</a:t>
+              <a:t>2024/4/22</a:t>
             </a:fld>
             <a:endParaRPr lang="zh-CN" altLang="en-US"/>
           </a:p>
@@ -2375,7 +2381,7 @@
           <a:p>
             <a:fld id="{9B0EB393-AB97-45F5-AC14-BC10F6BBB4A2}" type="datetimeFigureOut">
               <a:rPr lang="zh-CN" altLang="en-US" smtClean="0"/>
-              <a:t>2023-09-10</a:t>
+              <a:t>2024/4/22</a:t>
             </a:fld>
             <a:endParaRPr lang="zh-CN" altLang="en-US"/>
           </a:p>
@@ -2663,7 +2669,7 @@
           <a:p>
             <a:fld id="{9B0EB393-AB97-45F5-AC14-BC10F6BBB4A2}" type="datetimeFigureOut">
               <a:rPr lang="zh-CN" altLang="en-US" smtClean="0"/>
-              <a:t>2023-09-10</a:t>
+              <a:t>2024/4/22</a:t>
             </a:fld>
             <a:endParaRPr lang="zh-CN" altLang="en-US"/>
           </a:p>
@@ -2904,7 +2910,7 @@
           <a:p>
             <a:fld id="{9B0EB393-AB97-45F5-AC14-BC10F6BBB4A2}" type="datetimeFigureOut">
               <a:rPr lang="zh-CN" altLang="en-US" smtClean="0"/>
-              <a:t>2023-09-10</a:t>
+              <a:t>2024/4/22</a:t>
             </a:fld>
             <a:endParaRPr lang="zh-CN" altLang="en-US"/>
           </a:p>
@@ -4510,6 +4516,1254 @@
 </p:sld>
 </file>
 
+<file path=ppt/slides/slide2.xml><?xml version="1.0" encoding="utf-8"?>
+<p:sld xmlns:a="http://schemas.openxmlformats.org/drawingml/2006/main" xmlns:r="http://schemas.openxmlformats.org/officeDocument/2006/relationships" xmlns:p="http://schemas.openxmlformats.org/presentationml/2006/main">
+  <p:cSld>
+    <p:spTree>
+      <p:nvGrpSpPr>
+        <p:cNvPr id="1" name=""/>
+        <p:cNvGrpSpPr/>
+        <p:nvPr/>
+      </p:nvGrpSpPr>
+      <p:grpSpPr>
+        <a:xfrm>
+          <a:off x="0" y="0"/>
+          <a:ext cx="0" cy="0"/>
+          <a:chOff x="0" y="0"/>
+          <a:chExt cx="0" cy="0"/>
+        </a:xfrm>
+      </p:grpSpPr>
+      <p:grpSp>
+        <p:nvGrpSpPr>
+          <p:cNvPr id="29" name="组合 28">
+            <a:extLst>
+              <a:ext uri="{FF2B5EF4-FFF2-40B4-BE49-F238E27FC236}">
+                <a16:creationId xmlns:a16="http://schemas.microsoft.com/office/drawing/2014/main" id="{CBA6F1D7-E466-17F1-FB88-202D85106FA3}"/>
+              </a:ext>
+            </a:extLst>
+          </p:cNvPr>
+          <p:cNvGrpSpPr/>
+          <p:nvPr/>
+        </p:nvGrpSpPr>
+        <p:grpSpPr>
+          <a:xfrm>
+            <a:off x="1212980" y="410547"/>
+            <a:ext cx="9787812" cy="5497762"/>
+            <a:chOff x="1212980" y="410547"/>
+            <a:chExt cx="9787812" cy="5497762"/>
+          </a:xfrm>
+        </p:grpSpPr>
+        <p:sp>
+          <p:nvSpPr>
+            <p:cNvPr id="4" name="矩形: 圆角 3">
+              <a:extLst>
+                <a:ext uri="{FF2B5EF4-FFF2-40B4-BE49-F238E27FC236}">
+                  <a16:creationId xmlns:a16="http://schemas.microsoft.com/office/drawing/2014/main" id="{67F69EB6-968C-BD69-2FAC-FA794BE520A0}"/>
+                </a:ext>
+              </a:extLst>
+            </p:cNvPr>
+            <p:cNvSpPr/>
+            <p:nvPr/>
+          </p:nvSpPr>
+          <p:spPr>
+            <a:xfrm>
+              <a:off x="1212980" y="410547"/>
+              <a:ext cx="2136710" cy="821094"/>
+            </a:xfrm>
+            <a:prstGeom prst="roundRect">
+              <a:avLst/>
+            </a:prstGeom>
+            <a:solidFill>
+              <a:schemeClr val="accent5">
+                <a:lumMod val="20000"/>
+                <a:lumOff val="80000"/>
+              </a:schemeClr>
+            </a:solidFill>
+          </p:spPr>
+          <p:style>
+            <a:lnRef idx="2">
+              <a:schemeClr val="accent1">
+                <a:shade val="15000"/>
+              </a:schemeClr>
+            </a:lnRef>
+            <a:fillRef idx="1">
+              <a:schemeClr val="accent1"/>
+            </a:fillRef>
+            <a:effectRef idx="0">
+              <a:schemeClr val="accent1"/>
+            </a:effectRef>
+            <a:fontRef idx="minor">
+              <a:schemeClr val="lt1"/>
+            </a:fontRef>
+          </p:style>
+          <p:txBody>
+            <a:bodyPr rtlCol="0" anchor="ctr"/>
+            <a:lstStyle/>
+            <a:p>
+              <a:pPr algn="ctr"/>
+              <a:r>
+                <a:rPr lang="en-US" altLang="zh-CN" dirty="0">
+                  <a:solidFill>
+                    <a:schemeClr val="tx1"/>
+                  </a:solidFill>
+                </a:rPr>
+                <a:t>HSK</a:t>
+              </a:r>
+              <a:r>
+                <a:rPr lang="zh-CN" altLang="en-US" dirty="0">
+                  <a:solidFill>
+                    <a:schemeClr val="tx1"/>
+                  </a:solidFill>
+                </a:rPr>
+                <a:t> </a:t>
+              </a:r>
+              <a:r>
+                <a:rPr lang="en-US" altLang="zh-CN" dirty="0">
+                  <a:solidFill>
+                    <a:schemeClr val="tx1"/>
+                  </a:solidFill>
+                </a:rPr>
+                <a:t>Sample</a:t>
+              </a:r>
+            </a:p>
+            <a:p>
+              <a:pPr algn="ctr"/>
+              <a:r>
+                <a:rPr lang="en-US" altLang="zh-CN" dirty="0">
+                  <a:solidFill>
+                    <a:schemeClr val="tx1"/>
+                  </a:solidFill>
+                </a:rPr>
+                <a:t>6693</a:t>
+              </a:r>
+              <a:r>
+                <a:rPr lang="zh-CN" altLang="en-US" dirty="0">
+                  <a:solidFill>
+                    <a:schemeClr val="tx1"/>
+                  </a:solidFill>
+                </a:rPr>
+                <a:t>句</a:t>
+              </a:r>
+            </a:p>
+          </p:txBody>
+        </p:sp>
+        <p:sp>
+          <p:nvSpPr>
+            <p:cNvPr id="6" name="箭头: 下 5">
+              <a:extLst>
+                <a:ext uri="{FF2B5EF4-FFF2-40B4-BE49-F238E27FC236}">
+                  <a16:creationId xmlns:a16="http://schemas.microsoft.com/office/drawing/2014/main" id="{A23599C2-0C5B-469B-EEEC-427F7FC9FF25}"/>
+                </a:ext>
+              </a:extLst>
+            </p:cNvPr>
+            <p:cNvSpPr/>
+            <p:nvPr/>
+          </p:nvSpPr>
+          <p:spPr>
+            <a:xfrm>
+              <a:off x="2080727" y="1324947"/>
+              <a:ext cx="326571" cy="513184"/>
+            </a:xfrm>
+            <a:prstGeom prst="downArrow">
+              <a:avLst/>
+            </a:prstGeom>
+          </p:spPr>
+          <p:style>
+            <a:lnRef idx="2">
+              <a:schemeClr val="accent1">
+                <a:shade val="15000"/>
+              </a:schemeClr>
+            </a:lnRef>
+            <a:fillRef idx="1">
+              <a:schemeClr val="accent1"/>
+            </a:fillRef>
+            <a:effectRef idx="0">
+              <a:schemeClr val="accent1"/>
+            </a:effectRef>
+            <a:fontRef idx="minor">
+              <a:schemeClr val="lt1"/>
+            </a:fontRef>
+          </p:style>
+          <p:txBody>
+            <a:bodyPr rtlCol="0" anchor="ctr"/>
+            <a:lstStyle/>
+            <a:p>
+              <a:pPr algn="ctr"/>
+              <a:endParaRPr lang="zh-CN" altLang="en-US"/>
+            </a:p>
+          </p:txBody>
+        </p:sp>
+        <p:sp>
+          <p:nvSpPr>
+            <p:cNvPr id="7" name="文本框 6">
+              <a:extLst>
+                <a:ext uri="{FF2B5EF4-FFF2-40B4-BE49-F238E27FC236}">
+                  <a16:creationId xmlns:a16="http://schemas.microsoft.com/office/drawing/2014/main" id="{B0D12F4F-302E-985E-EBBF-539C27390405}"/>
+                </a:ext>
+              </a:extLst>
+            </p:cNvPr>
+            <p:cNvSpPr txBox="1"/>
+            <p:nvPr/>
+          </p:nvSpPr>
+          <p:spPr>
+            <a:xfrm>
+              <a:off x="3592286" y="597159"/>
+              <a:ext cx="4058816" cy="369332"/>
+            </a:xfrm>
+            <a:prstGeom prst="rect">
+              <a:avLst/>
+            </a:prstGeom>
+            <a:noFill/>
+          </p:spPr>
+          <p:txBody>
+            <a:bodyPr wrap="square" rtlCol="0">
+              <a:spAutoFit/>
+            </a:bodyPr>
+            <a:lstStyle/>
+            <a:p>
+              <a:r>
+                <a:rPr lang="zh-CN" altLang="en-US" dirty="0"/>
+                <a:t>“大家的关心和爱护温暖了他的心。</a:t>
+              </a:r>
+              <a:r>
+                <a:rPr lang="en-US" altLang="zh-CN" dirty="0"/>
+                <a:t>#</a:t>
+              </a:r>
+              <a:r>
+                <a:rPr lang="zh-CN" altLang="en-US" dirty="0"/>
+                <a:t>”</a:t>
+              </a:r>
+            </a:p>
+          </p:txBody>
+        </p:sp>
+        <p:sp>
+          <p:nvSpPr>
+            <p:cNvPr id="8" name="矩形 7">
+              <a:extLst>
+                <a:ext uri="{FF2B5EF4-FFF2-40B4-BE49-F238E27FC236}">
+                  <a16:creationId xmlns:a16="http://schemas.microsoft.com/office/drawing/2014/main" id="{9364647B-FE27-7B8B-B060-D770F9ACCB80}"/>
+                </a:ext>
+              </a:extLst>
+            </p:cNvPr>
+            <p:cNvSpPr/>
+            <p:nvPr/>
+          </p:nvSpPr>
+          <p:spPr>
+            <a:xfrm>
+              <a:off x="1287624" y="2164702"/>
+              <a:ext cx="2034074" cy="821094"/>
+            </a:xfrm>
+            <a:prstGeom prst="rect">
+              <a:avLst/>
+            </a:prstGeom>
+            <a:solidFill>
+              <a:schemeClr val="accent4">
+                <a:lumMod val="20000"/>
+                <a:lumOff val="80000"/>
+              </a:schemeClr>
+            </a:solidFill>
+          </p:spPr>
+          <p:style>
+            <a:lnRef idx="2">
+              <a:schemeClr val="accent1">
+                <a:shade val="15000"/>
+              </a:schemeClr>
+            </a:lnRef>
+            <a:fillRef idx="1">
+              <a:schemeClr val="accent1"/>
+            </a:fillRef>
+            <a:effectRef idx="0">
+              <a:schemeClr val="accent1"/>
+            </a:effectRef>
+            <a:fontRef idx="minor">
+              <a:schemeClr val="lt1"/>
+            </a:fontRef>
+          </p:style>
+          <p:txBody>
+            <a:bodyPr rtlCol="0" anchor="ctr"/>
+            <a:lstStyle/>
+            <a:p>
+              <a:pPr algn="ctr"/>
+              <a:r>
+                <a:rPr lang="en-US" altLang="zh-CN" dirty="0">
+                  <a:solidFill>
+                    <a:schemeClr val="tx1"/>
+                  </a:solidFill>
+                </a:rPr>
+                <a:t>Phonic Guide</a:t>
+              </a:r>
+            </a:p>
+            <a:p>
+              <a:pPr algn="ctr"/>
+              <a:r>
+                <a:rPr lang="en-US" altLang="zh-CN" dirty="0">
+                  <a:solidFill>
+                    <a:schemeClr val="tx1"/>
+                  </a:solidFill>
+                </a:rPr>
+                <a:t>Pinyin labeling</a:t>
+              </a:r>
+              <a:endParaRPr lang="zh-CN" altLang="en-US" dirty="0">
+                <a:solidFill>
+                  <a:schemeClr val="tx1"/>
+                </a:solidFill>
+              </a:endParaRPr>
+            </a:p>
+          </p:txBody>
+        </p:sp>
+        <p:sp>
+          <p:nvSpPr>
+            <p:cNvPr id="10" name="文本框 9">
+              <a:extLst>
+                <a:ext uri="{FF2B5EF4-FFF2-40B4-BE49-F238E27FC236}">
+                  <a16:creationId xmlns:a16="http://schemas.microsoft.com/office/drawing/2014/main" id="{FCB1CAF9-BF95-18F2-D55C-B69A6E36F890}"/>
+                </a:ext>
+              </a:extLst>
+            </p:cNvPr>
+            <p:cNvSpPr txBox="1"/>
+            <p:nvPr/>
+          </p:nvSpPr>
+          <p:spPr>
+            <a:xfrm>
+              <a:off x="3592286" y="2113584"/>
+              <a:ext cx="3685592" cy="923330"/>
+            </a:xfrm>
+            <a:prstGeom prst="rect">
+              <a:avLst/>
+            </a:prstGeom>
+            <a:noFill/>
+          </p:spPr>
+          <p:txBody>
+            <a:bodyPr wrap="square" rtlCol="0">
+              <a:spAutoFit/>
+            </a:bodyPr>
+            <a:lstStyle/>
+            <a:p>
+              <a:r>
+                <a:rPr lang="zh-CN" altLang="en-US" dirty="0"/>
+                <a:t>“大</a:t>
+              </a:r>
+              <a:r>
+                <a:rPr lang="en-US" altLang="zh-CN" dirty="0"/>
+                <a:t>(</a:t>
+              </a:r>
+              <a:r>
+                <a:rPr lang="en-US" altLang="zh-CN" dirty="0" err="1"/>
+                <a:t>dà</a:t>
+              </a:r>
+              <a:r>
+                <a:rPr lang="en-US" altLang="zh-CN" dirty="0"/>
+                <a:t>)</a:t>
+              </a:r>
+              <a:r>
+                <a:rPr lang="zh-CN" altLang="en-US" dirty="0"/>
+                <a:t>家</a:t>
+              </a:r>
+              <a:r>
+                <a:rPr lang="en-US" altLang="zh-CN" dirty="0"/>
+                <a:t>(</a:t>
+              </a:r>
+              <a:r>
+                <a:rPr lang="en-US" altLang="zh-CN" dirty="0" err="1"/>
+                <a:t>jiā</a:t>
+              </a:r>
+              <a:r>
+                <a:rPr lang="en-US" altLang="zh-CN" dirty="0"/>
+                <a:t>)</a:t>
+              </a:r>
+              <a:r>
+                <a:rPr lang="zh-CN" altLang="en-US" dirty="0"/>
+                <a:t>的</a:t>
+              </a:r>
+              <a:r>
+                <a:rPr lang="en-US" altLang="zh-CN" dirty="0"/>
+                <a:t>(de)</a:t>
+              </a:r>
+              <a:r>
+                <a:rPr lang="zh-CN" altLang="en-US" dirty="0"/>
+                <a:t>关</a:t>
+              </a:r>
+              <a:r>
+                <a:rPr lang="en-US" altLang="zh-CN" dirty="0"/>
+                <a:t>(</a:t>
+              </a:r>
+              <a:r>
+                <a:rPr lang="en-US" altLang="zh-CN" dirty="0" err="1"/>
+                <a:t>guān</a:t>
+              </a:r>
+              <a:r>
+                <a:rPr lang="en-US" altLang="zh-CN" dirty="0"/>
+                <a:t>)</a:t>
+              </a:r>
+              <a:r>
+                <a:rPr lang="zh-CN" altLang="en-US" dirty="0"/>
+                <a:t>心</a:t>
+              </a:r>
+              <a:r>
+                <a:rPr lang="en-US" altLang="zh-CN" dirty="0"/>
+                <a:t>(</a:t>
+              </a:r>
+              <a:r>
+                <a:rPr lang="en-US" altLang="zh-CN" dirty="0" err="1"/>
+                <a:t>xīn</a:t>
+              </a:r>
+              <a:r>
+                <a:rPr lang="en-US" altLang="zh-CN" dirty="0"/>
+                <a:t>)</a:t>
+              </a:r>
+              <a:r>
+                <a:rPr lang="zh-CN" altLang="en-US" dirty="0"/>
+                <a:t>和</a:t>
+              </a:r>
+              <a:r>
+                <a:rPr lang="en-US" altLang="zh-CN" dirty="0"/>
+                <a:t>(</a:t>
+              </a:r>
+              <a:r>
+                <a:rPr lang="en-US" altLang="zh-CN" dirty="0" err="1"/>
+                <a:t>hé</a:t>
+              </a:r>
+              <a:r>
+                <a:rPr lang="en-US" altLang="zh-CN" dirty="0"/>
+                <a:t>)</a:t>
+              </a:r>
+              <a:r>
+                <a:rPr lang="zh-CN" altLang="en-US" dirty="0"/>
+                <a:t>爱</a:t>
+              </a:r>
+              <a:r>
+                <a:rPr lang="en-US" altLang="zh-CN" dirty="0"/>
+                <a:t>(</a:t>
+              </a:r>
+              <a:r>
+                <a:rPr lang="en-US" altLang="zh-CN" dirty="0" err="1"/>
+                <a:t>ài</a:t>
+              </a:r>
+              <a:r>
+                <a:rPr lang="en-US" altLang="zh-CN" dirty="0"/>
+                <a:t>)</a:t>
+              </a:r>
+              <a:r>
+                <a:rPr lang="zh-CN" altLang="en-US" dirty="0"/>
+                <a:t>护</a:t>
+              </a:r>
+              <a:r>
+                <a:rPr lang="en-US" altLang="zh-CN" dirty="0"/>
+                <a:t>(</a:t>
+              </a:r>
+              <a:r>
+                <a:rPr lang="en-US" altLang="zh-CN" dirty="0" err="1"/>
+                <a:t>hù</a:t>
+              </a:r>
+              <a:r>
+                <a:rPr lang="en-US" altLang="zh-CN" dirty="0"/>
+                <a:t>)</a:t>
+              </a:r>
+              <a:r>
+                <a:rPr lang="zh-CN" altLang="en-US" dirty="0"/>
+                <a:t>温</a:t>
+              </a:r>
+              <a:r>
+                <a:rPr lang="en-US" altLang="zh-CN" dirty="0"/>
+                <a:t>(</a:t>
+              </a:r>
+              <a:r>
+                <a:rPr lang="en-US" altLang="zh-CN" dirty="0" err="1"/>
+                <a:t>wēn</a:t>
+              </a:r>
+              <a:r>
+                <a:rPr lang="en-US" altLang="zh-CN" dirty="0"/>
+                <a:t>)</a:t>
+              </a:r>
+              <a:r>
+                <a:rPr lang="zh-CN" altLang="en-US" dirty="0"/>
+                <a:t>暖</a:t>
+              </a:r>
+              <a:r>
+                <a:rPr lang="en-US" altLang="zh-CN" dirty="0"/>
+                <a:t>(</a:t>
+              </a:r>
+              <a:r>
+                <a:rPr lang="en-US" altLang="zh-CN" dirty="0" err="1"/>
+                <a:t>nuǎn</a:t>
+              </a:r>
+              <a:r>
+                <a:rPr lang="en-US" altLang="zh-CN" dirty="0"/>
+                <a:t>)</a:t>
+              </a:r>
+              <a:r>
+                <a:rPr lang="zh-CN" altLang="en-US" dirty="0"/>
+                <a:t>了</a:t>
+              </a:r>
+              <a:r>
+                <a:rPr lang="en-US" altLang="zh-CN" dirty="0"/>
+                <a:t>(le)</a:t>
+              </a:r>
+              <a:r>
+                <a:rPr lang="zh-CN" altLang="en-US" dirty="0"/>
+                <a:t>他</a:t>
+              </a:r>
+              <a:r>
+                <a:rPr lang="en-US" altLang="zh-CN" dirty="0"/>
+                <a:t>(</a:t>
+              </a:r>
+              <a:r>
+                <a:rPr lang="en-US" altLang="zh-CN" dirty="0" err="1"/>
+                <a:t>tā</a:t>
+              </a:r>
+              <a:r>
+                <a:rPr lang="en-US" altLang="zh-CN" dirty="0"/>
+                <a:t>)</a:t>
+              </a:r>
+              <a:r>
+                <a:rPr lang="zh-CN" altLang="en-US" dirty="0"/>
+                <a:t>的</a:t>
+              </a:r>
+              <a:r>
+                <a:rPr lang="en-US" altLang="zh-CN" dirty="0"/>
+                <a:t>(de)</a:t>
+              </a:r>
+              <a:r>
+                <a:rPr lang="zh-CN" altLang="en-US" dirty="0"/>
+                <a:t>心</a:t>
+              </a:r>
+              <a:r>
+                <a:rPr lang="en-US" altLang="zh-CN" dirty="0"/>
+                <a:t>(</a:t>
+              </a:r>
+              <a:r>
+                <a:rPr lang="en-US" altLang="zh-CN" dirty="0" err="1"/>
+                <a:t>xīn</a:t>
+              </a:r>
+              <a:r>
+                <a:rPr lang="en-US" altLang="zh-CN" dirty="0"/>
+                <a:t>)</a:t>
+              </a:r>
+              <a:r>
+                <a:rPr lang="zh-CN" altLang="en-US" dirty="0"/>
+                <a:t>。</a:t>
+              </a:r>
+              <a:r>
+                <a:rPr lang="en-US" altLang="zh-CN" dirty="0"/>
+                <a:t>#</a:t>
+              </a:r>
+              <a:r>
+                <a:rPr lang="zh-CN" altLang="en-US" dirty="0"/>
+                <a:t>”</a:t>
+              </a:r>
+            </a:p>
+          </p:txBody>
+        </p:sp>
+        <p:sp>
+          <p:nvSpPr>
+            <p:cNvPr id="12" name="矩形 11">
+              <a:extLst>
+                <a:ext uri="{FF2B5EF4-FFF2-40B4-BE49-F238E27FC236}">
+                  <a16:creationId xmlns:a16="http://schemas.microsoft.com/office/drawing/2014/main" id="{B0317BBB-417B-482A-B8EE-8D12661430E4}"/>
+                </a:ext>
+              </a:extLst>
+            </p:cNvPr>
+            <p:cNvSpPr/>
+            <p:nvPr/>
+          </p:nvSpPr>
+          <p:spPr>
+            <a:xfrm>
+              <a:off x="1315616" y="3379036"/>
+              <a:ext cx="2034074" cy="821094"/>
+            </a:xfrm>
+            <a:prstGeom prst="rect">
+              <a:avLst/>
+            </a:prstGeom>
+            <a:solidFill>
+              <a:schemeClr val="accent4">
+                <a:lumMod val="20000"/>
+                <a:lumOff val="80000"/>
+              </a:schemeClr>
+            </a:solidFill>
+          </p:spPr>
+          <p:style>
+            <a:lnRef idx="2">
+              <a:schemeClr val="accent1">
+                <a:shade val="15000"/>
+              </a:schemeClr>
+            </a:lnRef>
+            <a:fillRef idx="1">
+              <a:schemeClr val="accent1"/>
+            </a:fillRef>
+            <a:effectRef idx="0">
+              <a:schemeClr val="accent1"/>
+            </a:effectRef>
+            <a:fontRef idx="minor">
+              <a:schemeClr val="lt1"/>
+            </a:fontRef>
+          </p:style>
+          <p:txBody>
+            <a:bodyPr rtlCol="0" anchor="ctr"/>
+            <a:lstStyle/>
+            <a:p>
+              <a:pPr algn="ctr"/>
+              <a:r>
+                <a:rPr lang="en-US" altLang="zh-CN" dirty="0">
+                  <a:solidFill>
+                    <a:schemeClr val="tx1"/>
+                  </a:solidFill>
+                </a:rPr>
+                <a:t>Data Cleaning</a:t>
+              </a:r>
+              <a:endParaRPr lang="zh-CN" altLang="en-US" dirty="0">
+                <a:solidFill>
+                  <a:schemeClr val="tx1"/>
+                </a:solidFill>
+              </a:endParaRPr>
+            </a:p>
+          </p:txBody>
+        </p:sp>
+        <p:sp>
+          <p:nvSpPr>
+            <p:cNvPr id="14" name="文本框 13">
+              <a:extLst>
+                <a:ext uri="{FF2B5EF4-FFF2-40B4-BE49-F238E27FC236}">
+                  <a16:creationId xmlns:a16="http://schemas.microsoft.com/office/drawing/2014/main" id="{25C8060C-EA01-CB6F-3A80-6238BFDE9AB9}"/>
+                </a:ext>
+              </a:extLst>
+            </p:cNvPr>
+            <p:cNvSpPr txBox="1"/>
+            <p:nvPr/>
+          </p:nvSpPr>
+          <p:spPr>
+            <a:xfrm>
+              <a:off x="3592286" y="3260677"/>
+              <a:ext cx="4058816" cy="923330"/>
+            </a:xfrm>
+            <a:prstGeom prst="rect">
+              <a:avLst/>
+            </a:prstGeom>
+            <a:noFill/>
+          </p:spPr>
+          <p:txBody>
+            <a:bodyPr wrap="square">
+              <a:spAutoFit/>
+            </a:bodyPr>
+            <a:lstStyle/>
+            <a:p>
+              <a:r>
+                <a:rPr lang="zh-CN" altLang="en-US" dirty="0"/>
+                <a:t>大</a:t>
+              </a:r>
+              <a:r>
+                <a:rPr lang="en-US" altLang="zh-CN" dirty="0"/>
+                <a:t>(</a:t>
+              </a:r>
+              <a:r>
+                <a:rPr lang="en-US" altLang="zh-CN" dirty="0" err="1"/>
+                <a:t>dà</a:t>
+              </a:r>
+              <a:r>
+                <a:rPr lang="en-US" altLang="zh-CN" dirty="0"/>
+                <a:t>)</a:t>
+              </a:r>
+              <a:r>
+                <a:rPr lang="zh-CN" altLang="en-US" dirty="0"/>
+                <a:t>家</a:t>
+              </a:r>
+              <a:r>
+                <a:rPr lang="en-US" altLang="zh-CN" dirty="0"/>
+                <a:t>(</a:t>
+              </a:r>
+              <a:r>
+                <a:rPr lang="en-US" altLang="zh-CN" dirty="0" err="1"/>
+                <a:t>jiā</a:t>
+              </a:r>
+              <a:r>
+                <a:rPr lang="en-US" altLang="zh-CN" dirty="0"/>
+                <a:t>)</a:t>
+              </a:r>
+              <a:r>
+                <a:rPr lang="zh-CN" altLang="en-US" dirty="0"/>
+                <a:t>的</a:t>
+              </a:r>
+              <a:r>
+                <a:rPr lang="en-US" altLang="zh-CN" dirty="0"/>
+                <a:t>(de)</a:t>
+              </a:r>
+              <a:r>
+                <a:rPr lang="zh-CN" altLang="en-US" dirty="0"/>
+                <a:t>关</a:t>
+              </a:r>
+              <a:r>
+                <a:rPr lang="en-US" altLang="zh-CN" dirty="0"/>
+                <a:t>(</a:t>
+              </a:r>
+              <a:r>
+                <a:rPr lang="en-US" altLang="zh-CN" dirty="0" err="1"/>
+                <a:t>guān</a:t>
+              </a:r>
+              <a:r>
+                <a:rPr lang="en-US" altLang="zh-CN" dirty="0"/>
+                <a:t>)</a:t>
+              </a:r>
+              <a:r>
+                <a:rPr lang="zh-CN" altLang="en-US" dirty="0"/>
+                <a:t>心</a:t>
+              </a:r>
+              <a:r>
+                <a:rPr lang="en-US" altLang="zh-CN" dirty="0"/>
+                <a:t>(</a:t>
+              </a:r>
+              <a:r>
+                <a:rPr lang="en-US" altLang="zh-CN" dirty="0" err="1"/>
+                <a:t>xīn</a:t>
+              </a:r>
+              <a:r>
+                <a:rPr lang="en-US" altLang="zh-CN" dirty="0"/>
+                <a:t>)</a:t>
+              </a:r>
+              <a:r>
+                <a:rPr lang="zh-CN" altLang="en-US" dirty="0"/>
+                <a:t>和</a:t>
+              </a:r>
+              <a:r>
+                <a:rPr lang="en-US" altLang="zh-CN" dirty="0"/>
+                <a:t>(</a:t>
+              </a:r>
+              <a:r>
+                <a:rPr lang="en-US" altLang="zh-CN" dirty="0" err="1"/>
+                <a:t>hé</a:t>
+              </a:r>
+              <a:r>
+                <a:rPr lang="en-US" altLang="zh-CN" dirty="0"/>
+                <a:t>)</a:t>
+              </a:r>
+              <a:r>
+                <a:rPr lang="zh-CN" altLang="en-US" dirty="0"/>
+                <a:t>爱</a:t>
+              </a:r>
+              <a:r>
+                <a:rPr lang="en-US" altLang="zh-CN" dirty="0"/>
+                <a:t>(</a:t>
+              </a:r>
+              <a:r>
+                <a:rPr lang="en-US" altLang="zh-CN" dirty="0" err="1"/>
+                <a:t>ài</a:t>
+              </a:r>
+              <a:r>
+                <a:rPr lang="en-US" altLang="zh-CN" dirty="0"/>
+                <a:t>)</a:t>
+              </a:r>
+              <a:r>
+                <a:rPr lang="zh-CN" altLang="en-US" dirty="0"/>
+                <a:t>护</a:t>
+              </a:r>
+              <a:r>
+                <a:rPr lang="en-US" altLang="zh-CN" dirty="0"/>
+                <a:t>(</a:t>
+              </a:r>
+              <a:r>
+                <a:rPr lang="en-US" altLang="zh-CN" dirty="0" err="1"/>
+                <a:t>hù</a:t>
+              </a:r>
+              <a:r>
+                <a:rPr lang="en-US" altLang="zh-CN" dirty="0"/>
+                <a:t>)</a:t>
+              </a:r>
+              <a:r>
+                <a:rPr lang="zh-CN" altLang="en-US" dirty="0"/>
+                <a:t>温</a:t>
+              </a:r>
+              <a:r>
+                <a:rPr lang="en-US" altLang="zh-CN" dirty="0"/>
+                <a:t>(</a:t>
+              </a:r>
+              <a:r>
+                <a:rPr lang="en-US" altLang="zh-CN" dirty="0" err="1"/>
+                <a:t>wēn</a:t>
+              </a:r>
+              <a:r>
+                <a:rPr lang="en-US" altLang="zh-CN" dirty="0"/>
+                <a:t>)</a:t>
+              </a:r>
+              <a:r>
+                <a:rPr lang="zh-CN" altLang="en-US" dirty="0"/>
+                <a:t>暖</a:t>
+              </a:r>
+              <a:r>
+                <a:rPr lang="en-US" altLang="zh-CN" dirty="0"/>
+                <a:t>(</a:t>
+              </a:r>
+              <a:r>
+                <a:rPr lang="en-US" altLang="zh-CN" dirty="0" err="1"/>
+                <a:t>nuǎn</a:t>
+              </a:r>
+              <a:r>
+                <a:rPr lang="en-US" altLang="zh-CN" dirty="0"/>
+                <a:t>)</a:t>
+              </a:r>
+              <a:r>
+                <a:rPr lang="zh-CN" altLang="en-US" dirty="0"/>
+                <a:t>了</a:t>
+              </a:r>
+              <a:r>
+                <a:rPr lang="en-US" altLang="zh-CN" dirty="0"/>
+                <a:t>(le)</a:t>
+              </a:r>
+              <a:r>
+                <a:rPr lang="zh-CN" altLang="en-US" dirty="0"/>
+                <a:t>他</a:t>
+              </a:r>
+              <a:r>
+                <a:rPr lang="en-US" altLang="zh-CN" dirty="0"/>
+                <a:t>(</a:t>
+              </a:r>
+              <a:r>
+                <a:rPr lang="en-US" altLang="zh-CN" dirty="0" err="1"/>
+                <a:t>tā</a:t>
+              </a:r>
+              <a:r>
+                <a:rPr lang="en-US" altLang="zh-CN" dirty="0"/>
+                <a:t>)</a:t>
+              </a:r>
+              <a:r>
+                <a:rPr lang="zh-CN" altLang="en-US" dirty="0"/>
+                <a:t>的</a:t>
+              </a:r>
+              <a:r>
+                <a:rPr lang="en-US" altLang="zh-CN" dirty="0"/>
+                <a:t>(de)</a:t>
+              </a:r>
+              <a:r>
+                <a:rPr lang="zh-CN" altLang="en-US" dirty="0"/>
+                <a:t>心</a:t>
+              </a:r>
+              <a:r>
+                <a:rPr lang="en-US" altLang="zh-CN" dirty="0"/>
+                <a:t>(</a:t>
+              </a:r>
+              <a:r>
+                <a:rPr lang="en-US" altLang="zh-CN" dirty="0" err="1"/>
+                <a:t>xīn</a:t>
+              </a:r>
+              <a:r>
+                <a:rPr lang="en-US" altLang="zh-CN" dirty="0"/>
+                <a:t>)</a:t>
+              </a:r>
+              <a:r>
+                <a:rPr lang="zh-CN" altLang="en-US" dirty="0"/>
+                <a:t>。</a:t>
+              </a:r>
+            </a:p>
+          </p:txBody>
+        </p:sp>
+        <p:sp>
+          <p:nvSpPr>
+            <p:cNvPr id="16" name="矩形 15">
+              <a:extLst>
+                <a:ext uri="{FF2B5EF4-FFF2-40B4-BE49-F238E27FC236}">
+                  <a16:creationId xmlns:a16="http://schemas.microsoft.com/office/drawing/2014/main" id="{6866DB19-992A-39AE-B0EF-B4F9FB2A1846}"/>
+                </a:ext>
+              </a:extLst>
+            </p:cNvPr>
+            <p:cNvSpPr/>
+            <p:nvPr/>
+          </p:nvSpPr>
+          <p:spPr>
+            <a:xfrm>
+              <a:off x="1315616" y="4711959"/>
+              <a:ext cx="2034074" cy="821094"/>
+            </a:xfrm>
+            <a:prstGeom prst="rect">
+              <a:avLst/>
+            </a:prstGeom>
+            <a:solidFill>
+              <a:schemeClr val="accent4">
+                <a:lumMod val="20000"/>
+                <a:lumOff val="80000"/>
+              </a:schemeClr>
+            </a:solidFill>
+          </p:spPr>
+          <p:style>
+            <a:lnRef idx="2">
+              <a:schemeClr val="accent1">
+                <a:shade val="15000"/>
+              </a:schemeClr>
+            </a:lnRef>
+            <a:fillRef idx="1">
+              <a:schemeClr val="accent1"/>
+            </a:fillRef>
+            <a:effectRef idx="0">
+              <a:schemeClr val="accent1"/>
+            </a:effectRef>
+            <a:fontRef idx="minor">
+              <a:schemeClr val="lt1"/>
+            </a:fontRef>
+          </p:style>
+          <p:txBody>
+            <a:bodyPr rtlCol="0" anchor="ctr"/>
+            <a:lstStyle/>
+            <a:p>
+              <a:pPr algn="ctr"/>
+              <a:r>
+                <a:rPr lang="en-US" altLang="zh-CN" dirty="0">
+                  <a:solidFill>
+                    <a:schemeClr val="tx1"/>
+                  </a:solidFill>
+                </a:rPr>
+                <a:t>Input data</a:t>
+              </a:r>
+            </a:p>
+            <a:p>
+              <a:pPr algn="ctr"/>
+              <a:r>
+                <a:rPr lang="en-US" altLang="zh-CN" dirty="0">
+                  <a:solidFill>
+                    <a:schemeClr val="tx1"/>
+                  </a:solidFill>
+                </a:rPr>
+                <a:t>Predict </a:t>
+              </a:r>
+              <a:r>
+                <a:rPr lang="en-US" altLang="zh-CN" dirty="0" err="1">
+                  <a:solidFill>
+                    <a:schemeClr val="tx1"/>
+                  </a:solidFill>
+                </a:rPr>
+                <a:t>lable</a:t>
+              </a:r>
+              <a:endParaRPr lang="zh-CN" altLang="en-US" dirty="0">
+                <a:solidFill>
+                  <a:schemeClr val="tx1"/>
+                </a:solidFill>
+              </a:endParaRPr>
+            </a:p>
+          </p:txBody>
+        </p:sp>
+        <p:cxnSp>
+          <p:nvCxnSpPr>
+            <p:cNvPr id="18" name="连接符: 肘形 17">
+              <a:extLst>
+                <a:ext uri="{FF2B5EF4-FFF2-40B4-BE49-F238E27FC236}">
+                  <a16:creationId xmlns:a16="http://schemas.microsoft.com/office/drawing/2014/main" id="{C00A9187-0C23-7D89-B851-6B06FED65DBE}"/>
+                </a:ext>
+              </a:extLst>
+            </p:cNvPr>
+            <p:cNvCxnSpPr/>
+            <p:nvPr/>
+          </p:nvCxnSpPr>
+          <p:spPr>
+            <a:xfrm flipV="1">
+              <a:off x="3592286" y="4646645"/>
+              <a:ext cx="1604865" cy="475861"/>
+            </a:xfrm>
+            <a:prstGeom prst="bentConnector3">
+              <a:avLst/>
+            </a:prstGeom>
+            <a:ln w="38100">
+              <a:tailEnd type="triangle"/>
+            </a:ln>
+          </p:spPr>
+          <p:style>
+            <a:lnRef idx="1">
+              <a:schemeClr val="accent1"/>
+            </a:lnRef>
+            <a:fillRef idx="0">
+              <a:schemeClr val="accent1"/>
+            </a:fillRef>
+            <a:effectRef idx="0">
+              <a:schemeClr val="accent1"/>
+            </a:effectRef>
+            <a:fontRef idx="minor">
+              <a:schemeClr val="tx1"/>
+            </a:fontRef>
+          </p:style>
+        </p:cxnSp>
+        <p:cxnSp>
+          <p:nvCxnSpPr>
+            <p:cNvPr id="19" name="连接符: 肘形 18">
+              <a:extLst>
+                <a:ext uri="{FF2B5EF4-FFF2-40B4-BE49-F238E27FC236}">
+                  <a16:creationId xmlns:a16="http://schemas.microsoft.com/office/drawing/2014/main" id="{831B2655-BB5B-A69E-C7AF-8E7DD9E79A0B}"/>
+                </a:ext>
+              </a:extLst>
+            </p:cNvPr>
+            <p:cNvCxnSpPr>
+              <a:cxnSpLocks/>
+            </p:cNvCxnSpPr>
+            <p:nvPr/>
+          </p:nvCxnSpPr>
+          <p:spPr>
+            <a:xfrm>
+              <a:off x="3592285" y="5122505"/>
+              <a:ext cx="1604866" cy="462639"/>
+            </a:xfrm>
+            <a:prstGeom prst="bentConnector3">
+              <a:avLst/>
+            </a:prstGeom>
+            <a:ln w="38100">
+              <a:tailEnd type="triangle"/>
+            </a:ln>
+          </p:spPr>
+          <p:style>
+            <a:lnRef idx="1">
+              <a:schemeClr val="accent1"/>
+            </a:lnRef>
+            <a:fillRef idx="0">
+              <a:schemeClr val="accent1"/>
+            </a:fillRef>
+            <a:effectRef idx="0">
+              <a:schemeClr val="accent1"/>
+            </a:effectRef>
+            <a:fontRef idx="minor">
+              <a:schemeClr val="tx1"/>
+            </a:fontRef>
+          </p:style>
+        </p:cxnSp>
+        <p:sp>
+          <p:nvSpPr>
+            <p:cNvPr id="24" name="矩形 23">
+              <a:extLst>
+                <a:ext uri="{FF2B5EF4-FFF2-40B4-BE49-F238E27FC236}">
+                  <a16:creationId xmlns:a16="http://schemas.microsoft.com/office/drawing/2014/main" id="{A960C6A0-4D51-C381-4EA2-D047A78E5AA1}"/>
+                </a:ext>
+              </a:extLst>
+            </p:cNvPr>
+            <p:cNvSpPr/>
+            <p:nvPr/>
+          </p:nvSpPr>
+          <p:spPr>
+            <a:xfrm>
+              <a:off x="5435082" y="4441371"/>
+              <a:ext cx="1268963" cy="363894"/>
+            </a:xfrm>
+            <a:prstGeom prst="rect">
+              <a:avLst/>
+            </a:prstGeom>
+            <a:solidFill>
+              <a:schemeClr val="accent6">
+                <a:lumMod val="20000"/>
+                <a:lumOff val="80000"/>
+              </a:schemeClr>
+            </a:solidFill>
+          </p:spPr>
+          <p:style>
+            <a:lnRef idx="2">
+              <a:schemeClr val="accent1">
+                <a:shade val="15000"/>
+              </a:schemeClr>
+            </a:lnRef>
+            <a:fillRef idx="1">
+              <a:schemeClr val="accent1"/>
+            </a:fillRef>
+            <a:effectRef idx="0">
+              <a:schemeClr val="accent1"/>
+            </a:effectRef>
+            <a:fontRef idx="minor">
+              <a:schemeClr val="lt1"/>
+            </a:fontRef>
+          </p:style>
+          <p:txBody>
+            <a:bodyPr rtlCol="0" anchor="ctr"/>
+            <a:lstStyle/>
+            <a:p>
+              <a:pPr algn="ctr"/>
+              <a:r>
+                <a:rPr lang="en-US" altLang="zh-CN" dirty="0">
+                  <a:solidFill>
+                    <a:schemeClr val="tx1"/>
+                  </a:solidFill>
+                </a:rPr>
+                <a:t>Input data</a:t>
+              </a:r>
+              <a:endParaRPr lang="zh-CN" altLang="en-US" dirty="0">
+                <a:solidFill>
+                  <a:schemeClr val="tx1"/>
+                </a:solidFill>
+              </a:endParaRPr>
+            </a:p>
+          </p:txBody>
+        </p:sp>
+        <p:sp>
+          <p:nvSpPr>
+            <p:cNvPr id="26" name="矩形 25">
+              <a:extLst>
+                <a:ext uri="{FF2B5EF4-FFF2-40B4-BE49-F238E27FC236}">
+                  <a16:creationId xmlns:a16="http://schemas.microsoft.com/office/drawing/2014/main" id="{581A030F-7231-34C5-75B0-0AB385801421}"/>
+                </a:ext>
+              </a:extLst>
+            </p:cNvPr>
+            <p:cNvSpPr/>
+            <p:nvPr/>
+          </p:nvSpPr>
+          <p:spPr>
+            <a:xfrm>
+              <a:off x="5435081" y="5392777"/>
+              <a:ext cx="1268963" cy="483161"/>
+            </a:xfrm>
+            <a:prstGeom prst="rect">
+              <a:avLst/>
+            </a:prstGeom>
+            <a:solidFill>
+              <a:schemeClr val="accent6">
+                <a:lumMod val="20000"/>
+                <a:lumOff val="80000"/>
+              </a:schemeClr>
+            </a:solidFill>
+          </p:spPr>
+          <p:style>
+            <a:lnRef idx="2">
+              <a:schemeClr val="accent1">
+                <a:shade val="15000"/>
+              </a:schemeClr>
+            </a:lnRef>
+            <a:fillRef idx="1">
+              <a:schemeClr val="accent1"/>
+            </a:fillRef>
+            <a:effectRef idx="0">
+              <a:schemeClr val="accent1"/>
+            </a:effectRef>
+            <a:fontRef idx="minor">
+              <a:schemeClr val="lt1"/>
+            </a:fontRef>
+          </p:style>
+          <p:txBody>
+            <a:bodyPr rtlCol="0" anchor="ctr"/>
+            <a:lstStyle/>
+            <a:p>
+              <a:pPr algn="ctr"/>
+              <a:r>
+                <a:rPr lang="en-US" altLang="zh-CN" dirty="0">
+                  <a:solidFill>
+                    <a:schemeClr val="tx1"/>
+                  </a:solidFill>
+                </a:rPr>
+                <a:t>Predicted </a:t>
+              </a:r>
+            </a:p>
+            <a:p>
+              <a:pPr algn="ctr"/>
+              <a:r>
+                <a:rPr lang="en-US" altLang="zh-CN" dirty="0">
+                  <a:solidFill>
+                    <a:schemeClr val="tx1"/>
+                  </a:solidFill>
+                </a:rPr>
+                <a:t>label</a:t>
+              </a:r>
+              <a:endParaRPr lang="zh-CN" altLang="en-US" dirty="0">
+                <a:solidFill>
+                  <a:schemeClr val="tx1"/>
+                </a:solidFill>
+              </a:endParaRPr>
+            </a:p>
+          </p:txBody>
+        </p:sp>
+        <p:sp>
+          <p:nvSpPr>
+            <p:cNvPr id="27" name="文本框 26">
+              <a:extLst>
+                <a:ext uri="{FF2B5EF4-FFF2-40B4-BE49-F238E27FC236}">
+                  <a16:creationId xmlns:a16="http://schemas.microsoft.com/office/drawing/2014/main" id="{D59A1052-F8D9-217B-14D3-62BD888E5AE6}"/>
+                </a:ext>
+              </a:extLst>
+            </p:cNvPr>
+            <p:cNvSpPr txBox="1"/>
+            <p:nvPr/>
+          </p:nvSpPr>
+          <p:spPr>
+            <a:xfrm>
+              <a:off x="6941976" y="4300152"/>
+              <a:ext cx="4058816" cy="646331"/>
+            </a:xfrm>
+            <a:prstGeom prst="rect">
+              <a:avLst/>
+            </a:prstGeom>
+            <a:noFill/>
+          </p:spPr>
+          <p:txBody>
+            <a:bodyPr wrap="square">
+              <a:spAutoFit/>
+            </a:bodyPr>
+            <a:lstStyle/>
+            <a:p>
+              <a:r>
+                <a:rPr lang="en-US" altLang="zh-CN" dirty="0"/>
+                <a:t>da jia de guan </a:t>
+              </a:r>
+              <a:r>
+                <a:rPr lang="en-US" altLang="zh-CN" dirty="0" err="1"/>
+                <a:t>xin</a:t>
+              </a:r>
+              <a:r>
+                <a:rPr lang="en-US" altLang="zh-CN" dirty="0"/>
+                <a:t> he ai hu wen </a:t>
+              </a:r>
+              <a:r>
+                <a:rPr lang="en-US" altLang="zh-CN" dirty="0" err="1"/>
+                <a:t>nuan</a:t>
+              </a:r>
+              <a:r>
+                <a:rPr lang="en-US" altLang="zh-CN" dirty="0"/>
+                <a:t> le ta de </a:t>
+              </a:r>
+              <a:r>
+                <a:rPr lang="en-US" altLang="zh-CN" dirty="0" err="1"/>
+                <a:t>xin</a:t>
+              </a:r>
+              <a:r>
+                <a:rPr lang="zh-CN" altLang="en-US" dirty="0"/>
+                <a:t>。</a:t>
+              </a:r>
+            </a:p>
+          </p:txBody>
+        </p:sp>
+        <p:sp>
+          <p:nvSpPr>
+            <p:cNvPr id="28" name="文本框 27">
+              <a:extLst>
+                <a:ext uri="{FF2B5EF4-FFF2-40B4-BE49-F238E27FC236}">
+                  <a16:creationId xmlns:a16="http://schemas.microsoft.com/office/drawing/2014/main" id="{802A0782-5156-47DB-E09D-CD9D67F81123}"/>
+                </a:ext>
+              </a:extLst>
+            </p:cNvPr>
+            <p:cNvSpPr txBox="1"/>
+            <p:nvPr/>
+          </p:nvSpPr>
+          <p:spPr>
+            <a:xfrm>
+              <a:off x="6941976" y="5261978"/>
+              <a:ext cx="4058816" cy="646331"/>
+            </a:xfrm>
+            <a:prstGeom prst="rect">
+              <a:avLst/>
+            </a:prstGeom>
+            <a:noFill/>
+          </p:spPr>
+          <p:txBody>
+            <a:bodyPr wrap="square">
+              <a:spAutoFit/>
+            </a:bodyPr>
+            <a:lstStyle/>
+            <a:p>
+              <a:r>
+                <a:rPr lang="en-US" altLang="zh-CN" spc="600" dirty="0"/>
+                <a:t>4 1 0 1 1 2 4 4 1 3 0 1 0 1 5</a:t>
+              </a:r>
+              <a:endParaRPr lang="zh-CN" altLang="en-US" spc="600" dirty="0"/>
+            </a:p>
+          </p:txBody>
+        </p:sp>
+      </p:grpSp>
+    </p:spTree>
+    <p:extLst>
+      <p:ext uri="{BB962C8B-B14F-4D97-AF65-F5344CB8AC3E}">
+        <p14:creationId xmlns:p14="http://schemas.microsoft.com/office/powerpoint/2010/main" val="2682829859"/>
+      </p:ext>
+    </p:extLst>
+  </p:cSld>
+  <p:clrMapOvr>
+    <a:masterClrMapping/>
+  </p:clrMapOvr>
+</p:sld>
+</file>
+
 <file path=ppt/theme/theme1.xml><?xml version="1.0" encoding="utf-8"?>
 <a:theme xmlns:a="http://schemas.openxmlformats.org/drawingml/2006/main" name="Office 主题​​">
   <a:themeElements>

</xml_diff>